<commit_message>
Updated for feedback from Digilent
</commit_message>
<xml_diff>
--- a/03_Session_Three/Session_Three_lab.pptx
+++ b/03_Session_Three/Session_Three_lab.pptx
@@ -228,7 +228,7 @@
           <a:p>
             <a:fld id="{23E98C04-9E5E-451F-B1E8-32120E085B2F}" type="datetimeFigureOut">
               <a:rPr lang="en-US" smtClean="0"/>
-              <a:t>11/9/2021</a:t>
+              <a:t>1/28/2022</a:t>
             </a:fld>
             <a:endParaRPr lang="en-US"/>
           </a:p>
@@ -2994,7 +2994,7 @@
           <a:p>
             <a:fld id="{9E1009D0-2E2D-4576-9581-992E77D7F9F9}" type="datetime1">
               <a:rPr lang="en-US" smtClean="0"/>
-              <a:t>11/9/2021</a:t>
+              <a:t>1/28/2022</a:t>
             </a:fld>
             <a:endParaRPr lang="en-US"/>
           </a:p>
@@ -3196,7 +3196,7 @@
           <a:p>
             <a:fld id="{C01762A8-9106-478C-82C9-85C4D8753663}" type="datetime1">
               <a:rPr lang="en-US" smtClean="0"/>
-              <a:t>11/9/2021</a:t>
+              <a:t>1/28/2022</a:t>
             </a:fld>
             <a:endParaRPr lang="en-US"/>
           </a:p>
@@ -3407,7 +3407,7 @@
           <a:p>
             <a:fld id="{A657AF4A-80A9-43A3-82B8-5373B7C897E3}" type="datetime1">
               <a:rPr lang="en-US" smtClean="0"/>
-              <a:t>11/9/2021</a:t>
+              <a:t>1/28/2022</a:t>
             </a:fld>
             <a:endParaRPr lang="en-US"/>
           </a:p>
@@ -3877,7 +3877,7 @@
           <a:p>
             <a:fld id="{D9EA0D27-F759-4BB9-A74A-BD116BE4FD2A}" type="datetime1">
               <a:rPr lang="en-US" smtClean="0"/>
-              <a:t>11/9/2021</a:t>
+              <a:t>1/28/2022</a:t>
             </a:fld>
             <a:endParaRPr lang="en-US"/>
           </a:p>
@@ -4151,7 +4151,7 @@
           <a:p>
             <a:fld id="{BA04A777-792C-4049-89AA-C4D825EC1A4B}" type="datetime1">
               <a:rPr lang="en-US" smtClean="0"/>
-              <a:t>11/9/2021</a:t>
+              <a:t>1/28/2022</a:t>
             </a:fld>
             <a:endParaRPr lang="en-US"/>
           </a:p>
@@ -4566,7 +4566,7 @@
           <a:p>
             <a:fld id="{BC529E72-DEEC-4BAC-9013-E70BED12C4EC}" type="datetime1">
               <a:rPr lang="en-US" smtClean="0"/>
-              <a:t>11/9/2021</a:t>
+              <a:t>1/28/2022</a:t>
             </a:fld>
             <a:endParaRPr lang="en-US"/>
           </a:p>
@@ -4716,7 +4716,7 @@
           <a:p>
             <a:fld id="{834837DA-9E57-425C-BEE5-80CCA221B860}" type="datetime1">
               <a:rPr lang="en-US" smtClean="0"/>
-              <a:t>11/9/2021</a:t>
+              <a:t>1/28/2022</a:t>
             </a:fld>
             <a:endParaRPr lang="en-US"/>
           </a:p>
@@ -4832,7 +4832,7 @@
           <a:p>
             <a:fld id="{4F639C54-F12F-4F39-8251-CA876262F5CE}" type="datetime1">
               <a:rPr lang="en-US" smtClean="0"/>
-              <a:t>11/9/2021</a:t>
+              <a:t>1/28/2022</a:t>
             </a:fld>
             <a:endParaRPr lang="en-US"/>
           </a:p>
@@ -5146,7 +5146,7 @@
           <a:p>
             <a:fld id="{0D3BF144-7B92-4293-9DF9-3DE640C60A5D}" type="datetime1">
               <a:rPr lang="en-US" smtClean="0"/>
-              <a:t>11/9/2021</a:t>
+              <a:t>1/28/2022</a:t>
             </a:fld>
             <a:endParaRPr lang="en-US"/>
           </a:p>
@@ -5437,7 +5437,7 @@
           <a:p>
             <a:fld id="{B052D547-DBAF-42E0-A053-6D6D5BB528DB}" type="datetime1">
               <a:rPr lang="en-US" smtClean="0"/>
-              <a:t>11/9/2021</a:t>
+              <a:t>1/28/2022</a:t>
             </a:fld>
             <a:endParaRPr lang="en-US"/>
           </a:p>
@@ -5681,7 +5681,7 @@
           <a:p>
             <a:fld id="{37F73522-CA21-4EED-8420-289AA7B5D31B}" type="datetime1">
               <a:rPr lang="en-US" smtClean="0"/>
-              <a:t>11/9/2021</a:t>
+              <a:t>1/28/2022</a:t>
             </a:fld>
             <a:endParaRPr lang="en-US"/>
           </a:p>
@@ -6493,7 +6493,7 @@
             </a:r>
             <a:r>
               <a:rPr lang="en-US" dirty="0"/>
-              <a:t>Exist the dialog which is opened following the XSA Import. </a:t>
+              <a:t>Exit the dialog which is opened following the XSA Import. </a:t>
             </a:r>
           </a:p>
           <a:p>
@@ -14753,7 +14753,7 @@
           <p:nvPr>
             <p:extLst>
               <p:ext uri="{D42A27DB-BD31-4B8C-83A1-F6EECF244321}">
-                <p14:modId xmlns:p14="http://schemas.microsoft.com/office/powerpoint/2010/main" val="1469492643"/>
+                <p14:modId xmlns:p14="http://schemas.microsoft.com/office/powerpoint/2010/main" val="3108449331"/>
               </p:ext>
             </p:extLst>
           </p:nvPr>
@@ -15450,7 +15450,7 @@
             </a:r>
             <a:r>
               <a:rPr lang="en-US" dirty="0"/>
-              <a:t>Using a Linux Development machine with PetaLinux 2021.2 installed create a new project</a:t>
+              <a:t>Using a Linux Development machine with PetaLinux 2021.1 installed create a new project</a:t>
             </a:r>
           </a:p>
           <a:p>

</xml_diff>